<commit_message>
Minor edits and additions to the documentation.
</commit_message>
<xml_diff>
--- a/STUDIO_CLASSIC/slides/end-to-end-ml-sm.pptx
+++ b/STUDIO_CLASSIC/slides/end-to-end-ml-sm.pptx
@@ -365,7 +365,7 @@
           <a:p>
             <a:fld id="{D2887149-AF03-6142-908A-3DD284EAF54B}" type="datetimeFigureOut">
               <a:rPr lang="en-US" smtClean="0"/>
-              <a:t>11/8/21</a:t>
+              <a:t>1/29/24</a:t>
             </a:fld>
             <a:endParaRPr lang="en-US"/>
           </a:p>
@@ -547,7 +547,7 @@
             <a:fld id="{0B25AC41-3BEC-9247-8322-91B80C013F2D}" type="datetimeFigureOut">
               <a:rPr lang="en-US" smtClean="0"/>
               <a:pPr/>
-              <a:t>11/8/21</a:t>
+              <a:t>1/29/24</a:t>
             </a:fld>
             <a:endParaRPr lang="en-US" dirty="0"/>
           </a:p>
@@ -1034,7 +1034,7 @@
             <a:fld id="{CA8E1BB1-B036-4140-B110-296DC0701D04}" type="datetime8">
               <a:rPr lang="en-US" smtClean="0"/>
               <a:pPr/>
-              <a:t>11/8/21 6:41 PM</a:t>
+              <a:t>1/29/24 12:47 PM</a:t>
             </a:fld>
             <a:endParaRPr lang="en-US" dirty="0"/>
           </a:p>
@@ -10946,7 +10946,7 @@
         </p:nvSpPr>
         <p:spPr>
           <a:xfrm>
-            <a:off x="3335433" y="2295368"/>
+            <a:off x="2477396" y="2095158"/>
             <a:ext cx="2212547" cy="523220"/>
           </a:xfrm>
           <a:prstGeom prst="rect">
@@ -11003,7 +11003,7 @@
         </p:blipFill>
         <p:spPr>
           <a:xfrm>
-            <a:off x="4086106" y="1522864"/>
+            <a:off x="3228069" y="1322654"/>
             <a:ext cx="711200" cy="711200"/>
           </a:xfrm>
           <a:prstGeom prst="rect">
@@ -11393,82 +11393,6 @@
           </a:p>
         </p:txBody>
       </p:sp>
-      <p:sp>
-        <p:nvSpPr>
-          <p:cNvPr id="23" name="TextBox 22">
-            <a:extLst>
-              <a:ext uri="{FF2B5EF4-FFF2-40B4-BE49-F238E27FC236}">
-                <a16:creationId xmlns:a16="http://schemas.microsoft.com/office/drawing/2014/main" id="{03C7CB44-F8A7-3A4E-9A86-A86718C60A7F}"/>
-              </a:ext>
-            </a:extLst>
-          </p:cNvPr>
-          <p:cNvSpPr txBox="1"/>
-          <p:nvPr/>
-        </p:nvSpPr>
-        <p:spPr>
-          <a:xfrm>
-            <a:off x="661782" y="2257611"/>
-            <a:ext cx="1691411" cy="307777"/>
-          </a:xfrm>
-          <a:prstGeom prst="rect">
-            <a:avLst/>
-          </a:prstGeom>
-          <a:noFill/>
-        </p:spPr>
-        <p:txBody>
-          <a:bodyPr wrap="square" rtlCol="0">
-            <a:spAutoFit/>
-          </a:bodyPr>
-          <a:lstStyle/>
-          <a:p>
-            <a:pPr algn="ctr"/>
-            <a:r>
-              <a:rPr lang="en-US" sz="1400" dirty="0">
-                <a:latin typeface="+mj-lt"/>
-                <a:ea typeface="Amazon Ember" panose="020B0603020204020204" pitchFamily="34" charset="0"/>
-                <a:cs typeface="Amazon Ember" panose="020B0603020204020204" pitchFamily="34" charset="0"/>
-              </a:rPr>
-              <a:t>Amazon Athena</a:t>
-            </a:r>
-          </a:p>
-        </p:txBody>
-      </p:sp>
-      <p:pic>
-        <p:nvPicPr>
-          <p:cNvPr id="24" name="Graphic 23">
-            <a:extLst>
-              <a:ext uri="{FF2B5EF4-FFF2-40B4-BE49-F238E27FC236}">
-                <a16:creationId xmlns:a16="http://schemas.microsoft.com/office/drawing/2014/main" id="{73D5AF1A-8275-A54D-AD5C-EAB19D998000}"/>
-              </a:ext>
-            </a:extLst>
-          </p:cNvPr>
-          <p:cNvPicPr>
-            <a:picLocks noChangeAspect="1"/>
-          </p:cNvPicPr>
-          <p:nvPr/>
-        </p:nvPicPr>
-        <p:blipFill>
-          <a:blip r:embed="rId10">
-            <a:extLst>
-              <a:ext uri="{96DAC541-7B7A-43D3-8B79-37D633B846F1}">
-                <asvg:svgBlip xmlns:asvg="http://schemas.microsoft.com/office/drawing/2016/SVG/main" r:embed="rId11"/>
-              </a:ext>
-            </a:extLst>
-          </a:blip>
-          <a:stretch>
-            <a:fillRect/>
-          </a:stretch>
-        </p:blipFill>
-        <p:spPr>
-          <a:xfrm>
-            <a:off x="1151887" y="1522864"/>
-            <a:ext cx="711200" cy="711200"/>
-          </a:xfrm>
-          <a:prstGeom prst="rect">
-            <a:avLst/>
-          </a:prstGeom>
-        </p:spPr>
-      </p:pic>
       <p:cxnSp>
         <p:nvCxnSpPr>
           <p:cNvPr id="53" name="Elbow Connector 52">
@@ -11557,50 +11481,6 @@
       </p:cxnSp>
       <p:cxnSp>
         <p:nvCxnSpPr>
-          <p:cNvPr id="56" name="Elbow Connector 55">
-            <a:extLst>
-              <a:ext uri="{FF2B5EF4-FFF2-40B4-BE49-F238E27FC236}">
-                <a16:creationId xmlns:a16="http://schemas.microsoft.com/office/drawing/2014/main" id="{B9E139E0-E2E0-9445-9C8C-791104B6329B}"/>
-              </a:ext>
-            </a:extLst>
-          </p:cNvPr>
-          <p:cNvCxnSpPr>
-            <a:cxnSpLocks/>
-            <a:stCxn id="6" idx="1"/>
-            <a:endCxn id="23" idx="2"/>
-          </p:cNvCxnSpPr>
-          <p:nvPr/>
-        </p:nvCxnSpPr>
-        <p:spPr>
-          <a:xfrm rot="10800000">
-            <a:off x="1507489" y="2565388"/>
-            <a:ext cx="2701367" cy="3630358"/>
-          </a:xfrm>
-          <a:prstGeom prst="bentConnector2">
-            <a:avLst/>
-          </a:prstGeom>
-          <a:ln>
-            <a:headEnd type="triangle"/>
-            <a:tailEnd type="triangle"/>
-          </a:ln>
-        </p:spPr>
-        <p:style>
-          <a:lnRef idx="2">
-            <a:schemeClr val="accent1"/>
-          </a:lnRef>
-          <a:fillRef idx="0">
-            <a:schemeClr val="accent1"/>
-          </a:fillRef>
-          <a:effectRef idx="1">
-            <a:schemeClr val="accent1"/>
-          </a:effectRef>
-          <a:fontRef idx="minor">
-            <a:schemeClr val="tx1"/>
-          </a:fontRef>
-        </p:style>
-      </p:cxnSp>
-      <p:cxnSp>
-        <p:nvCxnSpPr>
           <p:cNvPr id="60" name="Elbow Connector 59">
             <a:extLst>
               <a:ext uri="{FF2B5EF4-FFF2-40B4-BE49-F238E27FC236}">
@@ -11739,10 +11619,10 @@
           <p:nvPr/>
         </p:nvPicPr>
         <p:blipFill>
-          <a:blip r:embed="rId12">
+          <a:blip r:embed="rId10">
             <a:extLst>
               <a:ext uri="{96DAC541-7B7A-43D3-8B79-37D633B846F1}">
-                <asvg:svgBlip xmlns:asvg="http://schemas.microsoft.com/office/drawing/2016/SVG/main" r:embed="rId13"/>
+                <asvg:svgBlip xmlns:asvg="http://schemas.microsoft.com/office/drawing/2016/SVG/main" r:embed="rId11"/>
               </a:ext>
             </a:extLst>
           </a:blip>
@@ -11877,9 +11757,9 @@
           <p:nvPr/>
         </p:nvCxnSpPr>
         <p:spPr>
-          <a:xfrm rot="5400000" flipH="1" flipV="1">
-            <a:off x="3725894" y="3530108"/>
-            <a:ext cx="1427332" cy="4293"/>
+          <a:xfrm rot="16200000" flipV="1">
+            <a:off x="3196771" y="3005277"/>
+            <a:ext cx="1627542" cy="853744"/>
           </a:xfrm>
           <a:prstGeom prst="bentConnector3">
             <a:avLst>
@@ -11931,8 +11811,8 @@
         </p:nvCxnSpPr>
         <p:spPr>
           <a:xfrm rot="16200000" flipV="1">
-            <a:off x="5016423" y="2243872"/>
-            <a:ext cx="1423218" cy="2572649"/>
+            <a:off x="4487299" y="1714749"/>
+            <a:ext cx="1623428" cy="3430686"/>
           </a:xfrm>
           <a:prstGeom prst="bentConnector3">
             <a:avLst>
@@ -11984,8 +11864,8 @@
         </p:nvCxnSpPr>
         <p:spPr>
           <a:xfrm rot="16200000" flipV="1">
-            <a:off x="6264198" y="996097"/>
-            <a:ext cx="1423218" cy="5068199"/>
+            <a:off x="5735074" y="466974"/>
+            <a:ext cx="1623428" cy="5926236"/>
           </a:xfrm>
           <a:prstGeom prst="bentConnector3">
             <a:avLst>
@@ -12033,8 +11913,8 @@
         </p:nvSpPr>
         <p:spPr>
           <a:xfrm>
-            <a:off x="661782" y="1170203"/>
-            <a:ext cx="4761515" cy="1632800"/>
+            <a:off x="1696278" y="914400"/>
+            <a:ext cx="3727019" cy="1888603"/>
           </a:xfrm>
           <a:prstGeom prst="rect">
             <a:avLst/>
@@ -12318,57 +12198,6 @@
           </a:p>
         </p:txBody>
       </p:sp>
-      <p:cxnSp>
-        <p:nvCxnSpPr>
-          <p:cNvPr id="70" name="Straight Arrow Connector 69">
-            <a:extLst>
-              <a:ext uri="{FF2B5EF4-FFF2-40B4-BE49-F238E27FC236}">
-                <a16:creationId xmlns:a16="http://schemas.microsoft.com/office/drawing/2014/main" id="{DA450F3F-5628-B443-8152-8D996C1EE45F}"/>
-              </a:ext>
-            </a:extLst>
-          </p:cNvPr>
-          <p:cNvCxnSpPr>
-            <a:cxnSpLocks/>
-            <a:stCxn id="24" idx="3"/>
-            <a:endCxn id="9" idx="1"/>
-          </p:cNvCxnSpPr>
-          <p:nvPr/>
-        </p:nvCxnSpPr>
-        <p:spPr>
-          <a:xfrm>
-            <a:off x="1863087" y="1878464"/>
-            <a:ext cx="2223019" cy="0"/>
-          </a:xfrm>
-          <a:prstGeom prst="straightConnector1">
-            <a:avLst/>
-          </a:prstGeom>
-          <a:ln w="12700">
-            <a:solidFill>
-              <a:schemeClr val="tx1">
-                <a:lumMod val="50000"/>
-              </a:schemeClr>
-            </a:solidFill>
-            <a:prstDash val="sysDot"/>
-            <a:headEnd type="triangle"/>
-            <a:tailEnd type="triangle"/>
-          </a:ln>
-          <a:effectLst/>
-        </p:spPr>
-        <p:style>
-          <a:lnRef idx="2">
-            <a:schemeClr val="accent1"/>
-          </a:lnRef>
-          <a:fillRef idx="0">
-            <a:schemeClr val="accent1"/>
-          </a:fillRef>
-          <a:effectRef idx="1">
-            <a:schemeClr val="accent1"/>
-          </a:effectRef>
-          <a:fontRef idx="minor">
-            <a:schemeClr val="tx1"/>
-          </a:fontRef>
-        </p:style>
-      </p:cxnSp>
       <p:cxnSp>
         <p:nvCxnSpPr>
           <p:cNvPr id="48" name="Elbow Connector 47">
@@ -13855,21 +13684,6 @@
 </file>
 
 <file path=customXml/item1.xml><?xml version="1.0" encoding="utf-8"?>
-<?mso-contentType ?>
-<FormTemplates xmlns="http://schemas.microsoft.com/sharepoint/v3/contenttype/forms">
-  <Display>DocumentLibraryForm</Display>
-  <Edit>DocumentLibraryForm</Edit>
-  <New>DocumentLibraryForm</New>
-</FormTemplates>
-</file>
-
-<file path=customXml/item2.xml><?xml version="1.0" encoding="utf-8"?>
-<p:properties xmlns:p="http://schemas.microsoft.com/office/2006/metadata/properties" xmlns:xsi="http://www.w3.org/2001/XMLSchema-instance">
-  <documentManagement/>
-</p:properties>
-</file>
-
-<file path=customXml/item3.xml><?xml version="1.0" encoding="utf-8"?>
 <ct:contentTypeSchema xmlns:ct="http://schemas.microsoft.com/office/2006/metadata/contentType" xmlns:ma="http://schemas.microsoft.com/office/2006/metadata/properties/metaAttributes" ct:_="" ma:_="" ma:contentTypeName="Document" ma:contentTypeID="0x010100D26A3D6C04DFD740953BA1B2B9E62D60" ma:contentTypeVersion="0" ma:contentTypeDescription="Create a new document." ma:contentTypeScope="" ma:versionID="26617cd14cd3af163c0e97ff614e520a">
   <xsd:schema xmlns:xsd="http://www.w3.org/2001/XMLSchema" xmlns:xs="http://www.w3.org/2001/XMLSchema" xmlns:p="http://schemas.microsoft.com/office/2006/metadata/properties" targetNamespace="http://schemas.microsoft.com/office/2006/metadata/properties" ma:root="true" ma:fieldsID="c64490b4aec6201516c3a874156f37b2">
     <xsd:element name="properties">
@@ -13983,10 +13797,33 @@
 </ct:contentTypeSchema>
 </file>
 
+<file path=customXml/item2.xml><?xml version="1.0" encoding="utf-8"?>
+<p:properties xmlns:p="http://schemas.microsoft.com/office/2006/metadata/properties" xmlns:xsi="http://www.w3.org/2001/XMLSchema-instance">
+  <documentManagement/>
+</p:properties>
+</file>
+
+<file path=customXml/item3.xml><?xml version="1.0" encoding="utf-8"?>
+<?mso-contentType ?>
+<FormTemplates xmlns="http://schemas.microsoft.com/sharepoint/v3/contenttype/forms">
+  <Display>DocumentLibraryForm</Display>
+  <Edit>DocumentLibraryForm</Edit>
+  <New>DocumentLibraryForm</New>
+</FormTemplates>
+</file>
+
 <file path=customXml/itemProps1.xml><?xml version="1.0" encoding="utf-8"?>
-<ds:datastoreItem xmlns:ds="http://schemas.openxmlformats.org/officeDocument/2006/customXml" ds:itemID="{705B35A6-8B52-46A5-AE45-B98C6459DC10}">
+<ds:datastoreItem xmlns:ds="http://schemas.openxmlformats.org/officeDocument/2006/customXml" ds:itemID="{51A3258A-222C-4488-825E-7520D001FB75}">
   <ds:schemaRefs>
-    <ds:schemaRef ds:uri="http://schemas.microsoft.com/sharepoint/v3/contenttype/forms"/>
+    <ds:schemaRef ds:uri="http://schemas.microsoft.com/office/2006/metadata/contentType"/>
+    <ds:schemaRef ds:uri="http://schemas.microsoft.com/office/2006/metadata/properties/metaAttributes"/>
+    <ds:schemaRef ds:uri="http://www.w3.org/2001/XMLSchema"/>
+    <ds:schemaRef ds:uri="http://schemas.microsoft.com/office/2006/metadata/properties"/>
+    <ds:schemaRef ds:uri="http://schemas.openxmlformats.org/package/2006/metadata/core-properties"/>
+    <ds:schemaRef ds:uri="http://purl.org/dc/elements/1.1/"/>
+    <ds:schemaRef ds:uri="http://purl.org/dc/terms/"/>
+    <ds:schemaRef ds:uri="http://schemas.microsoft.com/internal/obd"/>
+    <ds:schemaRef ds:uri="http://schemas.microsoft.com/office/infopath/2007/PartnerControls"/>
   </ds:schemaRefs>
 </ds:datastoreItem>
 </file>
@@ -14007,17 +13844,9 @@
 </file>
 
 <file path=customXml/itemProps3.xml><?xml version="1.0" encoding="utf-8"?>
-<ds:datastoreItem xmlns:ds="http://schemas.openxmlformats.org/officeDocument/2006/customXml" ds:itemID="{51A3258A-222C-4488-825E-7520D001FB75}">
+<ds:datastoreItem xmlns:ds="http://schemas.openxmlformats.org/officeDocument/2006/customXml" ds:itemID="{705B35A6-8B52-46A5-AE45-B98C6459DC10}">
   <ds:schemaRefs>
-    <ds:schemaRef ds:uri="http://schemas.microsoft.com/office/2006/metadata/contentType"/>
-    <ds:schemaRef ds:uri="http://schemas.microsoft.com/office/2006/metadata/properties/metaAttributes"/>
-    <ds:schemaRef ds:uri="http://www.w3.org/2001/XMLSchema"/>
-    <ds:schemaRef ds:uri="http://schemas.microsoft.com/office/2006/metadata/properties"/>
-    <ds:schemaRef ds:uri="http://schemas.openxmlformats.org/package/2006/metadata/core-properties"/>
-    <ds:schemaRef ds:uri="http://purl.org/dc/elements/1.1/"/>
-    <ds:schemaRef ds:uri="http://purl.org/dc/terms/"/>
-    <ds:schemaRef ds:uri="http://schemas.microsoft.com/internal/obd"/>
-    <ds:schemaRef ds:uri="http://schemas.microsoft.com/office/infopath/2007/PartnerControls"/>
+    <ds:schemaRef ds:uri="http://schemas.microsoft.com/sharepoint/v3/contenttype/forms"/>
   </ds:schemaRefs>
 </ds:datastoreItem>
 </file>
</xml_diff>